<commit_message>
intermediate check in, starts on logging and spectral loaders
</commit_message>
<xml_diff>
--- a/design/components.pptx
+++ b/design/components.pptx
@@ -104,6 +104,11 @@
       </a:defRPr>
     </a:lvl9pPr>
   </p:defaultTextStyle>
+  <p:extLst>
+    <p:ext uri="{EFAFB233-063F-42B5-8137-9DF3F51BA10A}">
+      <p15:sldGuideLst xmlns:p15="http://schemas.microsoft.com/office/powerpoint/2012/main"/>
+    </p:ext>
+  </p:extLst>
 </p:presentation>
 </file>
 
@@ -254,7 +259,7 @@
           <a:p>
             <a:fld id="{058B2198-0271-C74D-A073-57DB20F37549}" type="datetimeFigureOut">
               <a:rPr lang="en-US" smtClean="0"/>
-              <a:t>3/3/23</a:t>
+              <a:t>3/31/23</a:t>
             </a:fld>
             <a:endParaRPr lang="en-US"/>
           </a:p>
@@ -452,7 +457,7 @@
           <a:p>
             <a:fld id="{058B2198-0271-C74D-A073-57DB20F37549}" type="datetimeFigureOut">
               <a:rPr lang="en-US" smtClean="0"/>
-              <a:t>3/3/23</a:t>
+              <a:t>3/31/23</a:t>
             </a:fld>
             <a:endParaRPr lang="en-US"/>
           </a:p>
@@ -660,7 +665,7 @@
           <a:p>
             <a:fld id="{058B2198-0271-C74D-A073-57DB20F37549}" type="datetimeFigureOut">
               <a:rPr lang="en-US" smtClean="0"/>
-              <a:t>3/3/23</a:t>
+              <a:t>3/31/23</a:t>
             </a:fld>
             <a:endParaRPr lang="en-US"/>
           </a:p>
@@ -858,7 +863,7 @@
           <a:p>
             <a:fld id="{058B2198-0271-C74D-A073-57DB20F37549}" type="datetimeFigureOut">
               <a:rPr lang="en-US" smtClean="0"/>
-              <a:t>3/3/23</a:t>
+              <a:t>3/31/23</a:t>
             </a:fld>
             <a:endParaRPr lang="en-US"/>
           </a:p>
@@ -1133,7 +1138,7 @@
           <a:p>
             <a:fld id="{058B2198-0271-C74D-A073-57DB20F37549}" type="datetimeFigureOut">
               <a:rPr lang="en-US" smtClean="0"/>
-              <a:t>3/3/23</a:t>
+              <a:t>3/31/23</a:t>
             </a:fld>
             <a:endParaRPr lang="en-US"/>
           </a:p>
@@ -1398,7 +1403,7 @@
           <a:p>
             <a:fld id="{058B2198-0271-C74D-A073-57DB20F37549}" type="datetimeFigureOut">
               <a:rPr lang="en-US" smtClean="0"/>
-              <a:t>3/3/23</a:t>
+              <a:t>3/31/23</a:t>
             </a:fld>
             <a:endParaRPr lang="en-US"/>
           </a:p>
@@ -1810,7 +1815,7 @@
           <a:p>
             <a:fld id="{058B2198-0271-C74D-A073-57DB20F37549}" type="datetimeFigureOut">
               <a:rPr lang="en-US" smtClean="0"/>
-              <a:t>3/3/23</a:t>
+              <a:t>3/31/23</a:t>
             </a:fld>
             <a:endParaRPr lang="en-US"/>
           </a:p>
@@ -1951,7 +1956,7 @@
           <a:p>
             <a:fld id="{058B2198-0271-C74D-A073-57DB20F37549}" type="datetimeFigureOut">
               <a:rPr lang="en-US" smtClean="0"/>
-              <a:t>3/3/23</a:t>
+              <a:t>3/31/23</a:t>
             </a:fld>
             <a:endParaRPr lang="en-US"/>
           </a:p>
@@ -2064,7 +2069,7 @@
           <a:p>
             <a:fld id="{058B2198-0271-C74D-A073-57DB20F37549}" type="datetimeFigureOut">
               <a:rPr lang="en-US" smtClean="0"/>
-              <a:t>3/3/23</a:t>
+              <a:t>3/31/23</a:t>
             </a:fld>
             <a:endParaRPr lang="en-US"/>
           </a:p>
@@ -2375,7 +2380,7 @@
           <a:p>
             <a:fld id="{058B2198-0271-C74D-A073-57DB20F37549}" type="datetimeFigureOut">
               <a:rPr lang="en-US" smtClean="0"/>
-              <a:t>3/3/23</a:t>
+              <a:t>3/31/23</a:t>
             </a:fld>
             <a:endParaRPr lang="en-US"/>
           </a:p>
@@ -2663,7 +2668,7 @@
           <a:p>
             <a:fld id="{058B2198-0271-C74D-A073-57DB20F37549}" type="datetimeFigureOut">
               <a:rPr lang="en-US" smtClean="0"/>
-              <a:t>3/3/23</a:t>
+              <a:t>3/31/23</a:t>
             </a:fld>
             <a:endParaRPr lang="en-US"/>
           </a:p>
@@ -2904,7 +2909,7 @@
           <a:p>
             <a:fld id="{058B2198-0271-C74D-A073-57DB20F37549}" type="datetimeFigureOut">
               <a:rPr lang="en-US" smtClean="0"/>
-              <a:t>3/3/23</a:t>
+              <a:t>3/31/23</a:t>
             </a:fld>
             <a:endParaRPr lang="en-US"/>
           </a:p>
@@ -3386,7 +3391,11 @@
           <a:prstGeom prst="rect">
             <a:avLst/>
           </a:prstGeom>
-          <a:noFill/>
+          <a:solidFill>
+            <a:srgbClr val="92D050">
+              <a:alpha val="50000"/>
+            </a:srgbClr>
+          </a:solidFill>
           <a:ln w="25400">
             <a:solidFill>
               <a:schemeClr val="tx1"/>

</xml_diff>

<commit_message>
update status to show work-in-progress
</commit_message>
<xml_diff>
--- a/design/components.pptx
+++ b/design/components.pptx
@@ -259,7 +259,7 @@
           <a:p>
             <a:fld id="{058B2198-0271-C74D-A073-57DB20F37549}" type="datetimeFigureOut">
               <a:rPr lang="en-US" smtClean="0"/>
-              <a:t>3/31/23</a:t>
+              <a:t>8/21/23</a:t>
             </a:fld>
             <a:endParaRPr lang="en-US"/>
           </a:p>
@@ -457,7 +457,7 @@
           <a:p>
             <a:fld id="{058B2198-0271-C74D-A073-57DB20F37549}" type="datetimeFigureOut">
               <a:rPr lang="en-US" smtClean="0"/>
-              <a:t>3/31/23</a:t>
+              <a:t>8/21/23</a:t>
             </a:fld>
             <a:endParaRPr lang="en-US"/>
           </a:p>
@@ -665,7 +665,7 @@
           <a:p>
             <a:fld id="{058B2198-0271-C74D-A073-57DB20F37549}" type="datetimeFigureOut">
               <a:rPr lang="en-US" smtClean="0"/>
-              <a:t>3/31/23</a:t>
+              <a:t>8/21/23</a:t>
             </a:fld>
             <a:endParaRPr lang="en-US"/>
           </a:p>
@@ -863,7 +863,7 @@
           <a:p>
             <a:fld id="{058B2198-0271-C74D-A073-57DB20F37549}" type="datetimeFigureOut">
               <a:rPr lang="en-US" smtClean="0"/>
-              <a:t>3/31/23</a:t>
+              <a:t>8/21/23</a:t>
             </a:fld>
             <a:endParaRPr lang="en-US"/>
           </a:p>
@@ -1138,7 +1138,7 @@
           <a:p>
             <a:fld id="{058B2198-0271-C74D-A073-57DB20F37549}" type="datetimeFigureOut">
               <a:rPr lang="en-US" smtClean="0"/>
-              <a:t>3/31/23</a:t>
+              <a:t>8/21/23</a:t>
             </a:fld>
             <a:endParaRPr lang="en-US"/>
           </a:p>
@@ -1403,7 +1403,7 @@
           <a:p>
             <a:fld id="{058B2198-0271-C74D-A073-57DB20F37549}" type="datetimeFigureOut">
               <a:rPr lang="en-US" smtClean="0"/>
-              <a:t>3/31/23</a:t>
+              <a:t>8/21/23</a:t>
             </a:fld>
             <a:endParaRPr lang="en-US"/>
           </a:p>
@@ -1815,7 +1815,7 @@
           <a:p>
             <a:fld id="{058B2198-0271-C74D-A073-57DB20F37549}" type="datetimeFigureOut">
               <a:rPr lang="en-US" smtClean="0"/>
-              <a:t>3/31/23</a:t>
+              <a:t>8/21/23</a:t>
             </a:fld>
             <a:endParaRPr lang="en-US"/>
           </a:p>
@@ -1956,7 +1956,7 @@
           <a:p>
             <a:fld id="{058B2198-0271-C74D-A073-57DB20F37549}" type="datetimeFigureOut">
               <a:rPr lang="en-US" smtClean="0"/>
-              <a:t>3/31/23</a:t>
+              <a:t>8/21/23</a:t>
             </a:fld>
             <a:endParaRPr lang="en-US"/>
           </a:p>
@@ -2069,7 +2069,7 @@
           <a:p>
             <a:fld id="{058B2198-0271-C74D-A073-57DB20F37549}" type="datetimeFigureOut">
               <a:rPr lang="en-US" smtClean="0"/>
-              <a:t>3/31/23</a:t>
+              <a:t>8/21/23</a:t>
             </a:fld>
             <a:endParaRPr lang="en-US"/>
           </a:p>
@@ -2380,7 +2380,7 @@
           <a:p>
             <a:fld id="{058B2198-0271-C74D-A073-57DB20F37549}" type="datetimeFigureOut">
               <a:rPr lang="en-US" smtClean="0"/>
-              <a:t>3/31/23</a:t>
+              <a:t>8/21/23</a:t>
             </a:fld>
             <a:endParaRPr lang="en-US"/>
           </a:p>
@@ -2668,7 +2668,7 @@
           <a:p>
             <a:fld id="{058B2198-0271-C74D-A073-57DB20F37549}" type="datetimeFigureOut">
               <a:rPr lang="en-US" smtClean="0"/>
-              <a:t>3/31/23</a:t>
+              <a:t>8/21/23</a:t>
             </a:fld>
             <a:endParaRPr lang="en-US"/>
           </a:p>
@@ -2909,7 +2909,7 @@
           <a:p>
             <a:fld id="{058B2198-0271-C74D-A073-57DB20F37549}" type="datetimeFigureOut">
               <a:rPr lang="en-US" smtClean="0"/>
-              <a:t>3/31/23</a:t>
+              <a:t>8/21/23</a:t>
             </a:fld>
             <a:endParaRPr lang="en-US"/>
           </a:p>
@@ -3436,7 +3436,12 @@
           <a:prstGeom prst="rect">
             <a:avLst/>
           </a:prstGeom>
-          <a:noFill/>
+          <a:solidFill>
+            <a:schemeClr val="accent4">
+              <a:lumMod val="40000"/>
+              <a:lumOff val="60000"/>
+            </a:schemeClr>
+          </a:solidFill>
           <a:ln w="25400">
             <a:solidFill>
               <a:schemeClr val="tx1"/>
@@ -4092,7 +4097,12 @@
           <a:prstGeom prst="rect">
             <a:avLst/>
           </a:prstGeom>
-          <a:noFill/>
+          <a:solidFill>
+            <a:schemeClr val="accent4">
+              <a:lumMod val="40000"/>
+              <a:lumOff val="60000"/>
+            </a:schemeClr>
+          </a:solidFill>
           <a:ln w="25400">
             <a:solidFill>
               <a:schemeClr val="tx1"/>

</xml_diff>